<commit_message>
arch diagram pptx and png
</commit_message>
<xml_diff>
--- a/docs/images/dotnet-lambda-cicd-architecture-diagram.pptx
+++ b/docs/images/dotnet-lambda-cicd-architecture-diagram.pptx
@@ -9820,7 +9820,7 @@
         <p:spPr>
           <a:xfrm>
             <a:off x="2878885" y="1258247"/>
-            <a:ext cx="6434228" cy="5413486"/>
+            <a:ext cx="6320767" cy="5413486"/>
           </a:xfrm>
           <a:prstGeom prst="rect">
             <a:avLst/>
@@ -10593,7 +10593,7 @@
         </p:blipFill>
         <p:spPr bwMode="auto">
           <a:xfrm>
-            <a:off x="7897075" y="5216060"/>
+            <a:off x="7897075" y="5217406"/>
             <a:ext cx="762000" cy="762000"/>
           </a:xfrm>
           <a:prstGeom prst="rect">
@@ -10975,7 +10975,7 @@
         </p:blipFill>
         <p:spPr bwMode="auto">
           <a:xfrm>
-            <a:off x="5327869" y="5371152"/>
+            <a:off x="5327869" y="5369806"/>
             <a:ext cx="457200" cy="457200"/>
           </a:xfrm>
           <a:prstGeom prst="rect">
@@ -11035,7 +11035,7 @@
         </p:blipFill>
         <p:spPr bwMode="auto">
           <a:xfrm>
-            <a:off x="3757523" y="5218752"/>
+            <a:off x="3757523" y="5217406"/>
             <a:ext cx="762000" cy="762000"/>
           </a:xfrm>
           <a:prstGeom prst="rect">
@@ -11289,8 +11289,8 @@
         </p:nvCxnSpPr>
         <p:spPr>
           <a:xfrm flipV="1">
-            <a:off x="5730793" y="5598781"/>
-            <a:ext cx="827789" cy="972"/>
+            <a:off x="5720283" y="5598406"/>
+            <a:ext cx="827789" cy="1347"/>
           </a:xfrm>
           <a:prstGeom prst="straightConnector1">
             <a:avLst/>
@@ -11556,9 +11556,9 @@
           <p:nvPr/>
         </p:nvCxnSpPr>
         <p:spPr>
-          <a:xfrm flipV="1">
-            <a:off x="7015782" y="5597060"/>
-            <a:ext cx="881293" cy="1721"/>
+          <a:xfrm>
+            <a:off x="7005272" y="5598406"/>
+            <a:ext cx="891803" cy="0"/>
           </a:xfrm>
           <a:prstGeom prst="straightConnector1">
             <a:avLst/>
@@ -11568,7 +11568,7 @@
               <a:schemeClr val="tx2"/>
             </a:solidFill>
             <a:headEnd type="arrow" w="med" len="sm"/>
-            <a:tailEnd type="none" w="med" len="sm"/>
+            <a:tailEnd type="arrow" w="med" len="sm"/>
           </a:ln>
         </p:spPr>
         <p:style>
@@ -11652,7 +11652,7 @@
         <p:spPr>
           <a:xfrm flipV="1">
             <a:off x="4138523" y="4863819"/>
-            <a:ext cx="0" cy="354933"/>
+            <a:ext cx="0" cy="353587"/>
           </a:xfrm>
           <a:prstGeom prst="straightConnector1">
             <a:avLst/>
@@ -11896,7 +11896,7 @@
                 <a:latin typeface="Arial" panose="020B0604020202020204" pitchFamily="34" charset="0"/>
                 <a:cs typeface="Arial" panose="020B0604020202020204" pitchFamily="34" charset="0"/>
               </a:rPr>
-              <a:t>User</a:t>
+              <a:t>Developer</a:t>
             </a:r>
           </a:p>
         </p:txBody>
@@ -12174,7 +12174,7 @@
         </p:nvSpPr>
         <p:spPr bwMode="auto">
           <a:xfrm>
-            <a:off x="6097656" y="5988106"/>
+            <a:off x="6087146" y="5988106"/>
             <a:ext cx="1362074" cy="276999"/>
           </a:xfrm>
           <a:prstGeom prst="rect">
@@ -12348,7 +12348,7 @@
         </p:blipFill>
         <p:spPr bwMode="auto">
           <a:xfrm>
-            <a:off x="6558582" y="5370181"/>
+            <a:off x="6548072" y="5369806"/>
             <a:ext cx="457200" cy="457200"/>
           </a:xfrm>
           <a:prstGeom prst="rect">
@@ -12379,6 +12379,274 @@
           </a:extLst>
         </p:spPr>
       </p:pic>
+      <p:pic>
+        <p:nvPicPr>
+          <p:cNvPr id="45" name="Graphic 23">
+            <a:extLst>
+              <a:ext uri="{FF2B5EF4-FFF2-40B4-BE49-F238E27FC236}">
+                <a16:creationId xmlns:a16="http://schemas.microsoft.com/office/drawing/2014/main" id="{D00AF87E-73AF-4872-AEAE-9896B76842BB}"/>
+              </a:ext>
+            </a:extLst>
+          </p:cNvPr>
+          <p:cNvPicPr>
+            <a:picLocks noChangeAspect="1" noChangeArrowheads="1"/>
+          </p:cNvPicPr>
+          <p:nvPr/>
+        </p:nvPicPr>
+        <p:blipFill>
+          <a:blip r:embed="rId17">
+            <a:extLst>
+              <a:ext uri="{96DAC541-7B7A-43D3-8B79-37D633B846F1}">
+                <asvg:svgBlip xmlns:asvg="http://schemas.microsoft.com/office/drawing/2016/SVG/main" r:embed="rId18"/>
+              </a:ext>
+            </a:extLst>
+          </a:blip>
+          <a:srcRect/>
+          <a:stretch/>
+        </p:blipFill>
+        <p:spPr bwMode="auto">
+          <a:xfrm flipH="1">
+            <a:off x="9597591" y="5363456"/>
+            <a:ext cx="469900" cy="469900"/>
+          </a:xfrm>
+          <a:prstGeom prst="rect">
+            <a:avLst/>
+          </a:prstGeom>
+          <a:noFill/>
+          <a:ln>
+            <a:noFill/>
+          </a:ln>
+          <a:extLst>
+            <a:ext uri="{909E8E84-426E-40DD-AFC4-6F175D3DCCD1}">
+              <a14:hiddenFill xmlns:a14="http://schemas.microsoft.com/office/drawing/2010/main">
+                <a:solidFill>
+                  <a:srgbClr val="FFFFFF"/>
+                </a:solidFill>
+              </a14:hiddenFill>
+            </a:ext>
+            <a:ext uri="{91240B29-F687-4F45-9708-019B960494DF}">
+              <a14:hiddenLine xmlns:a14="http://schemas.microsoft.com/office/drawing/2010/main" w="9525">
+                <a:solidFill>
+                  <a:srgbClr val="000000"/>
+                </a:solidFill>
+                <a:miter lim="800000"/>
+                <a:headEnd/>
+                <a:tailEnd/>
+              </a14:hiddenLine>
+            </a:ext>
+          </a:extLst>
+        </p:spPr>
+      </p:pic>
+      <p:sp>
+        <p:nvSpPr>
+          <p:cNvPr id="46" name="TextBox 40">
+            <a:extLst>
+              <a:ext uri="{FF2B5EF4-FFF2-40B4-BE49-F238E27FC236}">
+                <a16:creationId xmlns:a16="http://schemas.microsoft.com/office/drawing/2014/main" id="{944F75AB-7FF8-4E28-8005-D913D269610C}"/>
+              </a:ext>
+            </a:extLst>
+          </p:cNvPr>
+          <p:cNvSpPr txBox="1">
+            <a:spLocks noChangeArrowheads="1"/>
+          </p:cNvSpPr>
+          <p:nvPr/>
+        </p:nvSpPr>
+        <p:spPr bwMode="auto">
+          <a:xfrm>
+            <a:off x="9295966" y="5980752"/>
+            <a:ext cx="1073150" cy="276999"/>
+          </a:xfrm>
+          <a:prstGeom prst="rect">
+            <a:avLst/>
+          </a:prstGeom>
+          <a:noFill/>
+          <a:ln>
+            <a:noFill/>
+          </a:ln>
+          <a:extLst>
+            <a:ext uri="{909E8E84-426E-40DD-AFC4-6F175D3DCCD1}">
+              <a14:hiddenFill xmlns:a14="http://schemas.microsoft.com/office/drawing/2010/main">
+                <a:solidFill>
+                  <a:srgbClr val="FFFFFF"/>
+                </a:solidFill>
+              </a14:hiddenFill>
+            </a:ext>
+            <a:ext uri="{91240B29-F687-4F45-9708-019B960494DF}">
+              <a14:hiddenLine xmlns:a14="http://schemas.microsoft.com/office/drawing/2010/main" w="9525">
+                <a:solidFill>
+                  <a:srgbClr val="000000"/>
+                </a:solidFill>
+                <a:miter lim="800000"/>
+                <a:headEnd/>
+                <a:tailEnd/>
+              </a14:hiddenLine>
+            </a:ext>
+          </a:extLst>
+        </p:spPr>
+        <p:txBody>
+          <a:bodyPr>
+            <a:spAutoFit/>
+          </a:bodyPr>
+          <a:lstStyle>
+            <a:lvl1pPr>
+              <a:defRPr>
+                <a:solidFill>
+                  <a:schemeClr val="tx1"/>
+                </a:solidFill>
+                <a:latin typeface="Calibri" panose="020F0502020204030204" pitchFamily="34" charset="0"/>
+              </a:defRPr>
+            </a:lvl1pPr>
+            <a:lvl2pPr marL="742950" indent="-285750">
+              <a:defRPr>
+                <a:solidFill>
+                  <a:schemeClr val="tx1"/>
+                </a:solidFill>
+                <a:latin typeface="Calibri" panose="020F0502020204030204" pitchFamily="34" charset="0"/>
+              </a:defRPr>
+            </a:lvl2pPr>
+            <a:lvl3pPr marL="1143000" indent="-228600">
+              <a:defRPr>
+                <a:solidFill>
+                  <a:schemeClr val="tx1"/>
+                </a:solidFill>
+                <a:latin typeface="Calibri" panose="020F0502020204030204" pitchFamily="34" charset="0"/>
+              </a:defRPr>
+            </a:lvl3pPr>
+            <a:lvl4pPr marL="1600200" indent="-228600">
+              <a:defRPr>
+                <a:solidFill>
+                  <a:schemeClr val="tx1"/>
+                </a:solidFill>
+                <a:latin typeface="Calibri" panose="020F0502020204030204" pitchFamily="34" charset="0"/>
+              </a:defRPr>
+            </a:lvl4pPr>
+            <a:lvl5pPr marL="2057400" indent="-228600">
+              <a:defRPr>
+                <a:solidFill>
+                  <a:schemeClr val="tx1"/>
+                </a:solidFill>
+                <a:latin typeface="Calibri" panose="020F0502020204030204" pitchFamily="34" charset="0"/>
+              </a:defRPr>
+            </a:lvl5pPr>
+            <a:lvl6pPr marL="2514600" indent="-228600" eaLnBrk="0" fontAlgn="base" hangingPunct="0">
+              <a:spcBef>
+                <a:spcPct val="0"/>
+              </a:spcBef>
+              <a:spcAft>
+                <a:spcPct val="0"/>
+              </a:spcAft>
+              <a:defRPr>
+                <a:solidFill>
+                  <a:schemeClr val="tx1"/>
+                </a:solidFill>
+                <a:latin typeface="Calibri" panose="020F0502020204030204" pitchFamily="34" charset="0"/>
+              </a:defRPr>
+            </a:lvl6pPr>
+            <a:lvl7pPr marL="2971800" indent="-228600" eaLnBrk="0" fontAlgn="base" hangingPunct="0">
+              <a:spcBef>
+                <a:spcPct val="0"/>
+              </a:spcBef>
+              <a:spcAft>
+                <a:spcPct val="0"/>
+              </a:spcAft>
+              <a:defRPr>
+                <a:solidFill>
+                  <a:schemeClr val="tx1"/>
+                </a:solidFill>
+                <a:latin typeface="Calibri" panose="020F0502020204030204" pitchFamily="34" charset="0"/>
+              </a:defRPr>
+            </a:lvl7pPr>
+            <a:lvl8pPr marL="3429000" indent="-228600" eaLnBrk="0" fontAlgn="base" hangingPunct="0">
+              <a:spcBef>
+                <a:spcPct val="0"/>
+              </a:spcBef>
+              <a:spcAft>
+                <a:spcPct val="0"/>
+              </a:spcAft>
+              <a:defRPr>
+                <a:solidFill>
+                  <a:schemeClr val="tx1"/>
+                </a:solidFill>
+                <a:latin typeface="Calibri" panose="020F0502020204030204" pitchFamily="34" charset="0"/>
+              </a:defRPr>
+            </a:lvl8pPr>
+            <a:lvl9pPr marL="3886200" indent="-228600" eaLnBrk="0" fontAlgn="base" hangingPunct="0">
+              <a:spcBef>
+                <a:spcPct val="0"/>
+              </a:spcBef>
+              <a:spcAft>
+                <a:spcPct val="0"/>
+              </a:spcAft>
+              <a:defRPr>
+                <a:solidFill>
+                  <a:schemeClr val="tx1"/>
+                </a:solidFill>
+                <a:latin typeface="Calibri" panose="020F0502020204030204" pitchFamily="34" charset="0"/>
+              </a:defRPr>
+            </a:lvl9pPr>
+          </a:lstStyle>
+          <a:p>
+            <a:pPr algn="ctr" eaLnBrk="1" hangingPunct="1"/>
+            <a:r>
+              <a:rPr lang="en-US" altLang="en-US" sz="1200" dirty="0">
+                <a:solidFill>
+                  <a:srgbClr val="000000"/>
+                </a:solidFill>
+                <a:latin typeface="Arial" panose="020B0604020202020204" pitchFamily="34" charset="0"/>
+                <a:cs typeface="Arial" panose="020B0604020202020204" pitchFamily="34" charset="0"/>
+              </a:rPr>
+              <a:t>Clients</a:t>
+            </a:r>
+          </a:p>
+        </p:txBody>
+      </p:sp>
+      <p:cxnSp>
+        <p:nvCxnSpPr>
+          <p:cNvPr id="49" name="Straight Arrow Connector 48">
+            <a:extLst>
+              <a:ext uri="{FF2B5EF4-FFF2-40B4-BE49-F238E27FC236}">
+                <a16:creationId xmlns:a16="http://schemas.microsoft.com/office/drawing/2014/main" id="{675B621A-D843-404D-BD02-AB581B3492CF}"/>
+              </a:ext>
+            </a:extLst>
+          </p:cNvPr>
+          <p:cNvCxnSpPr>
+            <a:cxnSpLocks/>
+            <a:stCxn id="51" idx="3"/>
+            <a:endCxn id="45" idx="3"/>
+          </p:cNvCxnSpPr>
+          <p:nvPr/>
+        </p:nvCxnSpPr>
+        <p:spPr>
+          <a:xfrm>
+            <a:off x="8659075" y="5598406"/>
+            <a:ext cx="938516" cy="0"/>
+          </a:xfrm>
+          <a:prstGeom prst="straightConnector1">
+            <a:avLst/>
+          </a:prstGeom>
+          <a:ln w="12700">
+            <a:solidFill>
+              <a:schemeClr val="tx2"/>
+            </a:solidFill>
+            <a:headEnd type="arrow" w="med" len="sm"/>
+            <a:tailEnd type="arrow" w="med" len="sm"/>
+          </a:ln>
+        </p:spPr>
+        <p:style>
+          <a:lnRef idx="1">
+            <a:schemeClr val="accent1"/>
+          </a:lnRef>
+          <a:fillRef idx="0">
+            <a:schemeClr val="accent1"/>
+          </a:fillRef>
+          <a:effectRef idx="0">
+            <a:schemeClr val="accent1"/>
+          </a:effectRef>
+          <a:fontRef idx="minor">
+            <a:schemeClr val="tx1"/>
+          </a:fontRef>
+        </p:style>
+      </p:cxnSp>
     </p:spTree>
     <p:extLst>
       <p:ext uri="{BB962C8B-B14F-4D97-AF65-F5344CB8AC3E}">

</xml_diff>